<commit_message>
Docs image with resizing
</commit_message>
<xml_diff>
--- a/pages/img/Architecture docs images.pptx
+++ b/pages/img/Architecture docs images.pptx
@@ -104,6 +104,11 @@
       </a:defRPr>
     </a:lvl9pPr>
   </p:defaultTextStyle>
+  <p:extLst>
+    <p:ext uri="{EFAFB233-063F-42B5-8137-9DF3F51BA10A}">
+      <p15:sldGuideLst xmlns:p15="http://schemas.microsoft.com/office/powerpoint/2012/main"/>
+    </p:ext>
+  </p:extLst>
 </p:presentation>
 </file>
 
@@ -3312,7 +3317,7 @@
         <p:spPr>
           <a:xfrm>
             <a:off x="2766349" y="1819275"/>
-            <a:ext cx="2609040" cy="2567530"/>
+            <a:ext cx="2609040" cy="2868472"/>
           </a:xfrm>
           <a:prstGeom prst="rect">
             <a:avLst/>
@@ -3341,20 +3346,34 @@
           </a:fontRef>
         </p:style>
         <p:txBody>
-          <a:bodyPr rtlCol="0" anchor="t"/>
+          <a:bodyPr tIns="288000" rtlCol="0" anchor="t"/>
           <a:lstStyle/>
           <a:p>
             <a:pPr algn="ctr"/>
             <a:r>
-              <a:rPr lang="en-US" sz="2000">
+              <a:rPr lang="en-US">
                 <a:solidFill>
                   <a:schemeClr val="tx1">
                     <a:lumMod val="75000"/>
                     <a:lumOff val="25000"/>
                   </a:schemeClr>
                 </a:solidFill>
+                <a:latin typeface="Suez One" pitchFamily="2" charset="-79"/>
+                <a:cs typeface="Suez One" pitchFamily="2" charset="-79"/>
               </a:rPr>
-              <a:t>Soda cloud account</a:t>
+              <a:t>Soda</a:t>
+            </a:r>
+            <a:r>
+              <a:rPr lang="en-US">
+                <a:solidFill>
+                  <a:schemeClr val="tx1">
+                    <a:lumMod val="75000"/>
+                    <a:lumOff val="25000"/>
+                  </a:schemeClr>
+                </a:solidFill>
+                <a:latin typeface="IBM Plex Sans" panose="020B0503050203000203" pitchFamily="34" charset="0"/>
+              </a:rPr>
+              <a:t> cloud account</a:t>
             </a:r>
           </a:p>
         </p:txBody>
@@ -3374,7 +3393,7 @@
         <p:spPr>
           <a:xfrm>
             <a:off x="6528121" y="1819275"/>
-            <a:ext cx="2604303" cy="2567530"/>
+            <a:ext cx="2604303" cy="2868472"/>
           </a:xfrm>
           <a:prstGeom prst="rect">
             <a:avLst/>
@@ -3403,18 +3422,19 @@
           </a:fontRef>
         </p:style>
         <p:txBody>
-          <a:bodyPr rtlCol="0" anchor="t"/>
+          <a:bodyPr tIns="288000" rtlCol="0" anchor="t"/>
           <a:lstStyle/>
           <a:p>
             <a:pPr algn="ctr"/>
             <a:r>
-              <a:rPr lang="en-US" sz="2000">
+              <a:rPr lang="en-US">
                 <a:solidFill>
                   <a:schemeClr val="tx1">
                     <a:lumMod val="75000"/>
                     <a:lumOff val="25000"/>
                   </a:schemeClr>
                 </a:solidFill>
+                <a:latin typeface="IBM Plex Sans" panose="020B0503050203000203" pitchFamily="34" charset="0"/>
               </a:rPr>
               <a:t>Your cloud account</a:t>
             </a:r>
@@ -3449,7 +3469,7 @@
         </p:blipFill>
         <p:spPr>
           <a:xfrm>
-            <a:off x="6793454" y="2440421"/>
+            <a:off x="6805029" y="2702413"/>
             <a:ext cx="711200" cy="711200"/>
           </a:xfrm>
           <a:prstGeom prst="rect">
@@ -3485,7 +3505,7 @@
         </p:blipFill>
         <p:spPr>
           <a:xfrm>
-            <a:off x="6793454" y="3413613"/>
+            <a:off x="6805029" y="3675605"/>
             <a:ext cx="711200" cy="711200"/>
           </a:xfrm>
           <a:prstGeom prst="rect">
@@ -3507,8 +3527,8 @@
         </p:nvSpPr>
         <p:spPr>
           <a:xfrm>
-            <a:off x="7504654" y="2626744"/>
-            <a:ext cx="1350947" cy="338554"/>
+            <a:off x="7516229" y="2888736"/>
+            <a:ext cx="1338828" cy="307777"/>
           </a:xfrm>
           <a:prstGeom prst="rect">
             <a:avLst/>
@@ -3522,7 +3542,9 @@
           <a:lstStyle/>
           <a:p>
             <a:r>
-              <a:rPr lang="en-US" sz="1600"/>
+              <a:rPr lang="en-US" sz="1400">
+                <a:latin typeface="IBM Plex Sans" panose="020B0503050203000203" pitchFamily="34" charset="0"/>
+              </a:rPr>
               <a:t>Your data lake</a:t>
             </a:r>
           </a:p>
@@ -3542,8 +3564,8 @@
         </p:nvSpPr>
         <p:spPr>
           <a:xfrm>
-            <a:off x="7504654" y="3599936"/>
-            <a:ext cx="1561005" cy="338554"/>
+            <a:off x="7516229" y="3861928"/>
+            <a:ext cx="1527982" cy="307777"/>
           </a:xfrm>
           <a:prstGeom prst="rect">
             <a:avLst/>
@@ -3557,7 +3579,9 @@
           <a:lstStyle/>
           <a:p>
             <a:r>
-              <a:rPr lang="en-US" sz="1600"/>
+              <a:rPr lang="en-US" sz="1400">
+                <a:latin typeface="IBM Plex Sans" panose="020B0503050203000203" pitchFamily="34" charset="0"/>
+              </a:rPr>
               <a:t>Soda file storage</a:t>
             </a:r>
           </a:p>
@@ -3579,7 +3603,7 @@
         </p:nvCxnSpPr>
         <p:spPr>
           <a:xfrm>
-            <a:off x="5011838" y="2801073"/>
+            <a:off x="5023413" y="3063065"/>
             <a:ext cx="1781616" cy="0"/>
           </a:xfrm>
           <a:prstGeom prst="straightConnector1">
@@ -3622,8 +3646,8 @@
         </p:nvSpPr>
         <p:spPr>
           <a:xfrm>
-            <a:off x="5540488" y="2509161"/>
-            <a:ext cx="868379" cy="307777"/>
+            <a:off x="5552063" y="2771153"/>
+            <a:ext cx="827471" cy="276999"/>
           </a:xfrm>
           <a:prstGeom prst="rect">
             <a:avLst/>
@@ -3637,7 +3661,9 @@
           <a:lstStyle/>
           <a:p>
             <a:r>
-              <a:rPr lang="en-US" sz="1400"/>
+              <a:rPr lang="en-US" sz="1200">
+                <a:latin typeface="IBM Plex Sans" panose="020B0503050203000203" pitchFamily="34" charset="0"/>
+              </a:rPr>
               <a:t>read only</a:t>
             </a:r>
           </a:p>
@@ -3659,7 +3685,7 @@
         </p:nvCxnSpPr>
         <p:spPr>
           <a:xfrm>
-            <a:off x="5011838" y="3782716"/>
+            <a:off x="5023413" y="4044708"/>
             <a:ext cx="1781616" cy="0"/>
           </a:xfrm>
           <a:prstGeom prst="straightConnector1">
@@ -3702,8 +3728,8 @@
         </p:nvSpPr>
         <p:spPr>
           <a:xfrm>
-            <a:off x="5520014" y="3502534"/>
-            <a:ext cx="936988" cy="307777"/>
+            <a:off x="5531589" y="3764526"/>
+            <a:ext cx="886781" cy="276999"/>
           </a:xfrm>
           <a:prstGeom prst="rect">
             <a:avLst/>
@@ -3717,7 +3743,9 @@
           <a:lstStyle/>
           <a:p>
             <a:r>
-              <a:rPr lang="en-US" sz="1400"/>
+              <a:rPr lang="en-US" sz="1200">
+                <a:latin typeface="IBM Plex Sans" panose="020B0503050203000203" pitchFamily="34" charset="0"/>
+              </a:rPr>
               <a:t>read write</a:t>
             </a:r>
           </a:p>
@@ -3737,8 +3765,8 @@
         </p:nvSpPr>
         <p:spPr>
           <a:xfrm>
-            <a:off x="3102015" y="2733093"/>
-            <a:ext cx="1690606" cy="1077218"/>
+            <a:off x="3113590" y="2995085"/>
+            <a:ext cx="1690606" cy="954107"/>
           </a:xfrm>
           <a:prstGeom prst="rect">
             <a:avLst/>
@@ -3752,13 +3780,17 @@
           <a:lstStyle/>
           <a:p>
             <a:r>
-              <a:rPr lang="en-US" sz="1600"/>
+              <a:rPr lang="en-US" sz="1400">
+                <a:latin typeface="IBM Plex Sans" panose="020B0503050203000203" pitchFamily="34" charset="0"/>
+              </a:rPr>
               <a:t>The actual data is processed, </a:t>
             </a:r>
           </a:p>
           <a:p>
             <a:r>
-              <a:rPr lang="en-US" sz="1600"/>
+              <a:rPr lang="en-US" sz="1400">
+                <a:latin typeface="IBM Plex Sans" panose="020B0503050203000203" pitchFamily="34" charset="0"/>
+              </a:rPr>
               <a:t>but not stored in the Soda account</a:t>
             </a:r>
           </a:p>

</xml_diff>

<commit_message>
First version of the technical docs
</commit_message>
<xml_diff>
--- a/pages/img/Architecture docs images.pptx
+++ b/pages/img/Architecture docs images.pptx
@@ -6,6 +6,8 @@
   </p:sldMasterIdLst>
   <p:sldIdLst>
     <p:sldId id="256" r:id="rId2"/>
+    <p:sldId id="257" r:id="rId3"/>
+    <p:sldId id="258" r:id="rId4"/>
   </p:sldIdLst>
   <p:sldSz cx="12192000" cy="6858000"/>
   <p:notesSz cx="6858000" cy="9144000"/>
@@ -2875,17 +2877,20 @@
           <a:bodyPr vert="horz" lIns="91440" tIns="45720" rIns="91440" bIns="45720" rtlCol="0" anchor="ctr"/>
           <a:lstStyle>
             <a:lvl1pPr algn="l">
-              <a:defRPr sz="1200">
+              <a:defRPr sz="1200" b="0" i="0">
                 <a:solidFill>
                   <a:schemeClr val="tx1">
                     <a:tint val="75000"/>
                   </a:schemeClr>
                 </a:solidFill>
+                <a:latin typeface="IBM Plex Sans Medium Regular" panose="020B0503050203000203" pitchFamily="34" charset="0"/>
               </a:defRPr>
             </a:lvl1pPr>
           </a:lstStyle>
           <a:p>
             <a:fld id="{ACDE960A-5AB1-7341-AAE0-C0D67DB383FC}" type="datetimeFigureOut">
+              <a:rPr lang="en-US"/>
+              <a:pPr/>
               <a:t>5/22/19</a:t>
             </a:fld>
             <a:endParaRPr lang="en-US"/>
@@ -2921,12 +2926,13 @@
           <a:bodyPr vert="horz" lIns="91440" tIns="45720" rIns="91440" bIns="45720" rtlCol="0" anchor="ctr"/>
           <a:lstStyle>
             <a:lvl1pPr algn="ctr">
-              <a:defRPr sz="1200">
+              <a:defRPr sz="1200" b="0" i="0">
                 <a:solidFill>
                   <a:schemeClr val="tx1">
                     <a:tint val="75000"/>
                   </a:schemeClr>
                 </a:solidFill>
+                <a:latin typeface="IBM Plex Sans Medium Regular" panose="020B0503050203000203" pitchFamily="34" charset="0"/>
               </a:defRPr>
             </a:lvl1pPr>
           </a:lstStyle>
@@ -2964,17 +2970,20 @@
           <a:bodyPr vert="horz" lIns="91440" tIns="45720" rIns="91440" bIns="45720" rtlCol="0" anchor="ctr"/>
           <a:lstStyle>
             <a:lvl1pPr algn="r">
-              <a:defRPr sz="1200">
+              <a:defRPr sz="1200" b="0" i="0">
                 <a:solidFill>
                   <a:schemeClr val="tx1">
                     <a:tint val="75000"/>
                   </a:schemeClr>
                 </a:solidFill>
+                <a:latin typeface="IBM Plex Sans Medium Regular" panose="020B0503050203000203" pitchFamily="34" charset="0"/>
               </a:defRPr>
             </a:lvl1pPr>
           </a:lstStyle>
           <a:p>
             <a:fld id="{8A200C54-1E67-AE4E-903D-63D96E34A32C}" type="slidenum">
+              <a:rPr lang="en-US"/>
+              <a:pPr/>
               <a:t>‹#›</a:t>
             </a:fld>
             <a:endParaRPr lang="en-US"/>
@@ -3012,11 +3021,11 @@
           <a:spcPct val="0"/>
         </a:spcBef>
         <a:buNone/>
-        <a:defRPr sz="4400" kern="1200">
+        <a:defRPr sz="4400" b="0" i="0" kern="1200">
           <a:solidFill>
             <a:schemeClr val="tx1"/>
           </a:solidFill>
-          <a:latin typeface="+mj-lt"/>
+          <a:latin typeface="IBM Plex Sans Light Regular"/>
           <a:ea typeface="+mj-ea"/>
           <a:cs typeface="+mj-cs"/>
         </a:defRPr>
@@ -3032,11 +3041,11 @@
         </a:spcBef>
         <a:buFont typeface="Arial" panose="020B0604020202020204" pitchFamily="34" charset="0"/>
         <a:buChar char="•"/>
-        <a:defRPr sz="2800" kern="1200">
+        <a:defRPr sz="2800" b="0" i="0" kern="1200">
           <a:solidFill>
             <a:schemeClr val="tx1"/>
           </a:solidFill>
-          <a:latin typeface="+mn-lt"/>
+          <a:latin typeface="IBM Plex Sans Medium Regular" panose="020B0503050203000203" pitchFamily="34" charset="0"/>
           <a:ea typeface="+mn-ea"/>
           <a:cs typeface="+mn-cs"/>
         </a:defRPr>
@@ -3050,11 +3059,11 @@
         </a:spcBef>
         <a:buFont typeface="Arial" panose="020B0604020202020204" pitchFamily="34" charset="0"/>
         <a:buChar char="•"/>
-        <a:defRPr sz="2400" kern="1200">
+        <a:defRPr sz="2400" b="0" i="0" kern="1200">
           <a:solidFill>
             <a:schemeClr val="tx1"/>
           </a:solidFill>
-          <a:latin typeface="+mn-lt"/>
+          <a:latin typeface="IBM Plex Sans Medium Regular" panose="020B0503050203000203" pitchFamily="34" charset="0"/>
           <a:ea typeface="+mn-ea"/>
           <a:cs typeface="+mn-cs"/>
         </a:defRPr>
@@ -3068,11 +3077,11 @@
         </a:spcBef>
         <a:buFont typeface="Arial" panose="020B0604020202020204" pitchFamily="34" charset="0"/>
         <a:buChar char="•"/>
-        <a:defRPr sz="2000" kern="1200">
+        <a:defRPr sz="2000" b="0" i="0" kern="1200">
           <a:solidFill>
             <a:schemeClr val="tx1"/>
           </a:solidFill>
-          <a:latin typeface="+mn-lt"/>
+          <a:latin typeface="IBM Plex Sans Medium Regular" panose="020B0503050203000203" pitchFamily="34" charset="0"/>
           <a:ea typeface="+mn-ea"/>
           <a:cs typeface="+mn-cs"/>
         </a:defRPr>
@@ -3086,11 +3095,11 @@
         </a:spcBef>
         <a:buFont typeface="Arial" panose="020B0604020202020204" pitchFamily="34" charset="0"/>
         <a:buChar char="•"/>
-        <a:defRPr sz="1800" kern="1200">
+        <a:defRPr sz="1800" b="0" i="0" kern="1200">
           <a:solidFill>
             <a:schemeClr val="tx1"/>
           </a:solidFill>
-          <a:latin typeface="+mn-lt"/>
+          <a:latin typeface="IBM Plex Sans Medium Regular" panose="020B0503050203000203" pitchFamily="34" charset="0"/>
           <a:ea typeface="+mn-ea"/>
           <a:cs typeface="+mn-cs"/>
         </a:defRPr>
@@ -3104,11 +3113,11 @@
         </a:spcBef>
         <a:buFont typeface="Arial" panose="020B0604020202020204" pitchFamily="34" charset="0"/>
         <a:buChar char="•"/>
-        <a:defRPr sz="1800" kern="1200">
+        <a:defRPr sz="1800" b="0" i="0" kern="1200">
           <a:solidFill>
             <a:schemeClr val="tx1"/>
           </a:solidFill>
-          <a:latin typeface="+mn-lt"/>
+          <a:latin typeface="IBM Plex Sans Medium Regular" panose="020B0503050203000203" pitchFamily="34" charset="0"/>
           <a:ea typeface="+mn-ea"/>
           <a:cs typeface="+mn-cs"/>
         </a:defRPr>
@@ -3800,6 +3809,1532 @@
     <p:extLst>
       <p:ext uri="{BB962C8B-B14F-4D97-AF65-F5344CB8AC3E}">
         <p14:creationId xmlns:p14="http://schemas.microsoft.com/office/powerpoint/2010/main" val="1788580107"/>
+      </p:ext>
+    </p:extLst>
+  </p:cSld>
+  <p:clrMapOvr>
+    <a:masterClrMapping/>
+  </p:clrMapOvr>
+</p:sld>
+</file>
+
+<file path=ppt/slides/slide2.xml><?xml version="1.0" encoding="utf-8"?>
+<p:sld xmlns:a="http://schemas.openxmlformats.org/drawingml/2006/main" xmlns:r="http://schemas.openxmlformats.org/officeDocument/2006/relationships" xmlns:p="http://schemas.openxmlformats.org/presentationml/2006/main">
+  <p:cSld>
+    <p:spTree>
+      <p:nvGrpSpPr>
+        <p:cNvPr id="1" name=""/>
+        <p:cNvGrpSpPr/>
+        <p:nvPr/>
+      </p:nvGrpSpPr>
+      <p:grpSpPr>
+        <a:xfrm>
+          <a:off x="0" y="0"/>
+          <a:ext cx="0" cy="0"/>
+          <a:chOff x="0" y="0"/>
+          <a:chExt cx="0" cy="0"/>
+        </a:xfrm>
+      </p:grpSpPr>
+      <p:sp>
+        <p:nvSpPr>
+          <p:cNvPr id="6" name="Rectangle 5">
+            <a:extLst>
+              <a:ext uri="{FF2B5EF4-FFF2-40B4-BE49-F238E27FC236}">
+                <a16:creationId xmlns:a16="http://schemas.microsoft.com/office/drawing/2014/main" id="{75C178CC-A8FC-294D-A8B2-560D90C52CEC}"/>
+              </a:ext>
+            </a:extLst>
+          </p:cNvPr>
+          <p:cNvSpPr/>
+          <p:nvPr/>
+        </p:nvSpPr>
+        <p:spPr>
+          <a:xfrm>
+            <a:off x="2864386" y="1004027"/>
+            <a:ext cx="6202496" cy="4900062"/>
+          </a:xfrm>
+          <a:prstGeom prst="rect">
+            <a:avLst/>
+          </a:prstGeom>
+          <a:solidFill>
+            <a:srgbClr val="61D597">
+              <a:alpha val="18039"/>
+            </a:srgbClr>
+          </a:solidFill>
+          <a:ln>
+            <a:noFill/>
+          </a:ln>
+        </p:spPr>
+        <p:style>
+          <a:lnRef idx="2">
+            <a:schemeClr val="accent1">
+              <a:shade val="50000"/>
+            </a:schemeClr>
+          </a:lnRef>
+          <a:fillRef idx="1">
+            <a:schemeClr val="accent1"/>
+          </a:fillRef>
+          <a:effectRef idx="0">
+            <a:schemeClr val="accent1"/>
+          </a:effectRef>
+          <a:fontRef idx="minor">
+            <a:schemeClr val="lt1"/>
+          </a:fontRef>
+        </p:style>
+        <p:txBody>
+          <a:bodyPr tIns="288000" rtlCol="0" anchor="t"/>
+          <a:lstStyle/>
+          <a:p>
+            <a:pPr algn="ctr"/>
+            <a:r>
+              <a:rPr lang="en-US">
+                <a:solidFill>
+                  <a:schemeClr val="tx1">
+                    <a:lumMod val="75000"/>
+                    <a:lumOff val="25000"/>
+                  </a:schemeClr>
+                </a:solidFill>
+                <a:latin typeface="Suez One" pitchFamily="2" charset="-79"/>
+                <a:cs typeface="Suez One" pitchFamily="2" charset="-79"/>
+              </a:rPr>
+              <a:t>Soda</a:t>
+            </a:r>
+            <a:r>
+              <a:rPr lang="en-US">
+                <a:solidFill>
+                  <a:schemeClr val="tx1">
+                    <a:lumMod val="75000"/>
+                    <a:lumOff val="25000"/>
+                  </a:schemeClr>
+                </a:solidFill>
+                <a:latin typeface="IBM Plex Sans" panose="020B0503050203000203" pitchFamily="34" charset="0"/>
+              </a:rPr>
+              <a:t> client cloud account</a:t>
+            </a:r>
+          </a:p>
+        </p:txBody>
+      </p:sp>
+      <p:sp>
+        <p:nvSpPr>
+          <p:cNvPr id="7" name="Rectangle 6">
+            <a:extLst>
+              <a:ext uri="{FF2B5EF4-FFF2-40B4-BE49-F238E27FC236}">
+                <a16:creationId xmlns:a16="http://schemas.microsoft.com/office/drawing/2014/main" id="{A7470E5C-7D3A-9C47-B7DE-0CD95A92F313}"/>
+              </a:ext>
+            </a:extLst>
+          </p:cNvPr>
+          <p:cNvSpPr/>
+          <p:nvPr/>
+        </p:nvSpPr>
+        <p:spPr>
+          <a:xfrm>
+            <a:off x="9309253" y="1004027"/>
+            <a:ext cx="2311704" cy="4900062"/>
+          </a:xfrm>
+          <a:prstGeom prst="rect">
+            <a:avLst/>
+          </a:prstGeom>
+          <a:solidFill>
+            <a:schemeClr val="bg1">
+              <a:lumMod val="95000"/>
+            </a:schemeClr>
+          </a:solidFill>
+          <a:ln>
+            <a:noFill/>
+          </a:ln>
+        </p:spPr>
+        <p:style>
+          <a:lnRef idx="2">
+            <a:schemeClr val="accent1">
+              <a:shade val="50000"/>
+            </a:schemeClr>
+          </a:lnRef>
+          <a:fillRef idx="1">
+            <a:schemeClr val="accent1"/>
+          </a:fillRef>
+          <a:effectRef idx="0">
+            <a:schemeClr val="accent1"/>
+          </a:effectRef>
+          <a:fontRef idx="minor">
+            <a:schemeClr val="lt1"/>
+          </a:fontRef>
+        </p:style>
+        <p:txBody>
+          <a:bodyPr tIns="288000" rtlCol="0" anchor="t"/>
+          <a:lstStyle/>
+          <a:p>
+            <a:pPr algn="ctr"/>
+            <a:r>
+              <a:rPr lang="en-US">
+                <a:solidFill>
+                  <a:schemeClr val="tx1">
+                    <a:lumMod val="75000"/>
+                    <a:lumOff val="25000"/>
+                  </a:schemeClr>
+                </a:solidFill>
+                <a:latin typeface="IBM Plex Sans" panose="020B0503050203000203" pitchFamily="34" charset="0"/>
+              </a:rPr>
+              <a:t>Client data account</a:t>
+            </a:r>
+          </a:p>
+        </p:txBody>
+      </p:sp>
+      <p:sp>
+        <p:nvSpPr>
+          <p:cNvPr id="8" name="Smiley Face 7">
+            <a:extLst>
+              <a:ext uri="{FF2B5EF4-FFF2-40B4-BE49-F238E27FC236}">
+                <a16:creationId xmlns:a16="http://schemas.microsoft.com/office/drawing/2014/main" id="{1EA96E5A-C71C-9A4B-AA3C-44B1C82E768C}"/>
+              </a:ext>
+            </a:extLst>
+          </p:cNvPr>
+          <p:cNvSpPr/>
+          <p:nvPr/>
+        </p:nvSpPr>
+        <p:spPr>
+          <a:xfrm>
+            <a:off x="1774752" y="1807060"/>
+            <a:ext cx="443966" cy="417035"/>
+          </a:xfrm>
+          <a:prstGeom prst="smileyFace">
+            <a:avLst/>
+          </a:prstGeom>
+          <a:solidFill>
+            <a:schemeClr val="bg1">
+              <a:lumMod val="85000"/>
+            </a:schemeClr>
+          </a:solidFill>
+          <a:ln>
+            <a:solidFill>
+              <a:schemeClr val="tx1">
+                <a:lumMod val="50000"/>
+                <a:lumOff val="50000"/>
+              </a:schemeClr>
+            </a:solidFill>
+          </a:ln>
+        </p:spPr>
+        <p:style>
+          <a:lnRef idx="2">
+            <a:schemeClr val="accent1">
+              <a:shade val="50000"/>
+            </a:schemeClr>
+          </a:lnRef>
+          <a:fillRef idx="1">
+            <a:schemeClr val="accent1"/>
+          </a:fillRef>
+          <a:effectRef idx="0">
+            <a:schemeClr val="accent1"/>
+          </a:effectRef>
+          <a:fontRef idx="minor">
+            <a:schemeClr val="lt1"/>
+          </a:fontRef>
+        </p:style>
+        <p:txBody>
+          <a:bodyPr rot="0" spcFirstLastPara="0" vertOverflow="overflow" horzOverflow="overflow" vert="horz" wrap="square" lIns="91440" tIns="45720" rIns="91440" bIns="45720" numCol="1" spcCol="0" rtlCol="0" fromWordArt="0" anchor="ctr" anchorCtr="0" forceAA="0" compatLnSpc="1">
+            <a:prstTxWarp prst="textNoShape">
+              <a:avLst/>
+            </a:prstTxWarp>
+            <a:noAutofit/>
+          </a:bodyPr>
+          <a:lstStyle/>
+          <a:p>
+            <a:pPr algn="ctr"/>
+            <a:endParaRPr lang="en-US">
+              <a:solidFill>
+                <a:schemeClr val="tx1"/>
+              </a:solidFill>
+              <a:latin typeface="IBM Plex Sans Medium" panose="020B0503050203000203" pitchFamily="34" charset="0"/>
+            </a:endParaRPr>
+          </a:p>
+        </p:txBody>
+      </p:sp>
+      <p:pic>
+        <p:nvPicPr>
+          <p:cNvPr id="9" name="Graphic 8">
+            <a:extLst>
+              <a:ext uri="{FF2B5EF4-FFF2-40B4-BE49-F238E27FC236}">
+                <a16:creationId xmlns:a16="http://schemas.microsoft.com/office/drawing/2014/main" id="{1A68DC78-5AAD-E34C-AA3A-1C248D086874}"/>
+              </a:ext>
+            </a:extLst>
+          </p:cNvPr>
+          <p:cNvPicPr>
+            <a:picLocks noChangeAspect="1"/>
+          </p:cNvPicPr>
+          <p:nvPr/>
+        </p:nvPicPr>
+        <p:blipFill>
+          <a:blip r:embed="rId2">
+            <a:extLst>
+              <a:ext uri="{96DAC541-7B7A-43D3-8B79-37D633B846F1}">
+                <asvg:svgBlip xmlns:asvg="http://schemas.microsoft.com/office/drawing/2016/SVG/main" r:embed="rId3"/>
+              </a:ext>
+            </a:extLst>
+          </a:blip>
+          <a:stretch>
+            <a:fillRect/>
+          </a:stretch>
+        </p:blipFill>
+        <p:spPr>
+          <a:xfrm>
+            <a:off x="3356286" y="2701909"/>
+            <a:ext cx="711200" cy="711200"/>
+          </a:xfrm>
+          <a:prstGeom prst="rect">
+            <a:avLst/>
+          </a:prstGeom>
+        </p:spPr>
+      </p:pic>
+      <p:pic>
+        <p:nvPicPr>
+          <p:cNvPr id="18" name="Picture 17">
+            <a:extLst>
+              <a:ext uri="{FF2B5EF4-FFF2-40B4-BE49-F238E27FC236}">
+                <a16:creationId xmlns:a16="http://schemas.microsoft.com/office/drawing/2014/main" id="{DAA587AB-E81C-0B42-9BB8-4E9A978AB20B}"/>
+              </a:ext>
+            </a:extLst>
+          </p:cNvPr>
+          <p:cNvPicPr>
+            <a:picLocks noChangeAspect="1"/>
+          </p:cNvPicPr>
+          <p:nvPr/>
+        </p:nvPicPr>
+        <p:blipFill>
+          <a:blip r:embed="rId4"/>
+          <a:stretch>
+            <a:fillRect/>
+          </a:stretch>
+        </p:blipFill>
+        <p:spPr>
+          <a:xfrm>
+            <a:off x="1554591" y="2585222"/>
+            <a:ext cx="885825" cy="885825"/>
+          </a:xfrm>
+          <a:prstGeom prst="rect">
+            <a:avLst/>
+          </a:prstGeom>
+        </p:spPr>
+      </p:pic>
+      <p:sp>
+        <p:nvSpPr>
+          <p:cNvPr id="19" name="TextBox 18">
+            <a:extLst>
+              <a:ext uri="{FF2B5EF4-FFF2-40B4-BE49-F238E27FC236}">
+                <a16:creationId xmlns:a16="http://schemas.microsoft.com/office/drawing/2014/main" id="{887405AF-6492-A140-89F8-4485078EF9CA}"/>
+              </a:ext>
+            </a:extLst>
+          </p:cNvPr>
+          <p:cNvSpPr txBox="1"/>
+          <p:nvPr/>
+        </p:nvSpPr>
+        <p:spPr>
+          <a:xfrm>
+            <a:off x="1576521" y="1535570"/>
+            <a:ext cx="873957" cy="276999"/>
+          </a:xfrm>
+          <a:prstGeom prst="rect">
+            <a:avLst/>
+          </a:prstGeom>
+          <a:noFill/>
+        </p:spPr>
+        <p:txBody>
+          <a:bodyPr wrap="none" rtlCol="0">
+            <a:spAutoFit/>
+          </a:bodyPr>
+          <a:lstStyle/>
+          <a:p>
+            <a:r>
+              <a:rPr lang="en-US" sz="1200">
+                <a:latin typeface="IBM Plex Sans" panose="020B0503050203000203" pitchFamily="34" charset="0"/>
+              </a:rPr>
+              <a:t>Soda user</a:t>
+            </a:r>
+          </a:p>
+        </p:txBody>
+      </p:sp>
+      <p:sp>
+        <p:nvSpPr>
+          <p:cNvPr id="20" name="TextBox 19">
+            <a:extLst>
+              <a:ext uri="{FF2B5EF4-FFF2-40B4-BE49-F238E27FC236}">
+                <a16:creationId xmlns:a16="http://schemas.microsoft.com/office/drawing/2014/main" id="{3C3D45C0-9FA7-DD4B-832C-D1CF8E7B233C}"/>
+              </a:ext>
+            </a:extLst>
+          </p:cNvPr>
+          <p:cNvSpPr txBox="1"/>
+          <p:nvPr/>
+        </p:nvSpPr>
+        <p:spPr>
+          <a:xfrm>
+            <a:off x="1654407" y="3490135"/>
+            <a:ext cx="752129" cy="276999"/>
+          </a:xfrm>
+          <a:prstGeom prst="rect">
+            <a:avLst/>
+          </a:prstGeom>
+          <a:noFill/>
+        </p:spPr>
+        <p:txBody>
+          <a:bodyPr wrap="none" rtlCol="0">
+            <a:spAutoFit/>
+          </a:bodyPr>
+          <a:lstStyle/>
+          <a:p>
+            <a:r>
+              <a:rPr lang="en-US" sz="1200">
+                <a:latin typeface="IBM Plex Sans" panose="020B0503050203000203" pitchFamily="34" charset="0"/>
+              </a:rPr>
+              <a:t>browser</a:t>
+            </a:r>
+          </a:p>
+        </p:txBody>
+      </p:sp>
+      <p:cxnSp>
+        <p:nvCxnSpPr>
+          <p:cNvPr id="22" name="Straight Arrow Connector 21">
+            <a:extLst>
+              <a:ext uri="{FF2B5EF4-FFF2-40B4-BE49-F238E27FC236}">
+                <a16:creationId xmlns:a16="http://schemas.microsoft.com/office/drawing/2014/main" id="{565E4009-35C8-9D4D-B9D9-1DB61F2D8C33}"/>
+              </a:ext>
+            </a:extLst>
+          </p:cNvPr>
+          <p:cNvCxnSpPr>
+            <a:cxnSpLocks/>
+          </p:cNvCxnSpPr>
+          <p:nvPr/>
+        </p:nvCxnSpPr>
+        <p:spPr>
+          <a:xfrm flipH="1">
+            <a:off x="1991606" y="2368322"/>
+            <a:ext cx="5129" cy="194997"/>
+          </a:xfrm>
+          <a:prstGeom prst="straightConnector1">
+            <a:avLst/>
+          </a:prstGeom>
+          <a:ln w="12700">
+            <a:solidFill>
+              <a:schemeClr val="bg1">
+                <a:lumMod val="50000"/>
+              </a:schemeClr>
+            </a:solidFill>
+            <a:headEnd type="none"/>
+            <a:tailEnd type="arrow" w="lg" len="lg"/>
+          </a:ln>
+        </p:spPr>
+        <p:style>
+          <a:lnRef idx="1">
+            <a:schemeClr val="accent1"/>
+          </a:lnRef>
+          <a:fillRef idx="0">
+            <a:schemeClr val="accent1"/>
+          </a:fillRef>
+          <a:effectRef idx="0">
+            <a:schemeClr val="accent1"/>
+          </a:effectRef>
+          <a:fontRef idx="minor">
+            <a:schemeClr val="tx1"/>
+          </a:fontRef>
+        </p:style>
+      </p:cxnSp>
+      <p:cxnSp>
+        <p:nvCxnSpPr>
+          <p:cNvPr id="23" name="Straight Arrow Connector 22">
+            <a:extLst>
+              <a:ext uri="{FF2B5EF4-FFF2-40B4-BE49-F238E27FC236}">
+                <a16:creationId xmlns:a16="http://schemas.microsoft.com/office/drawing/2014/main" id="{C3E2ACFC-6AAA-6741-8F5E-85DE1CB554E3}"/>
+              </a:ext>
+            </a:extLst>
+          </p:cNvPr>
+          <p:cNvCxnSpPr>
+            <a:cxnSpLocks/>
+          </p:cNvCxnSpPr>
+          <p:nvPr/>
+        </p:nvCxnSpPr>
+        <p:spPr>
+          <a:xfrm>
+            <a:off x="2561602" y="3028135"/>
+            <a:ext cx="566051" cy="1"/>
+          </a:xfrm>
+          <a:prstGeom prst="straightConnector1">
+            <a:avLst/>
+          </a:prstGeom>
+          <a:ln w="12700">
+            <a:solidFill>
+              <a:schemeClr val="bg1">
+                <a:lumMod val="50000"/>
+              </a:schemeClr>
+            </a:solidFill>
+            <a:headEnd type="none"/>
+            <a:tailEnd type="arrow" w="lg" len="lg"/>
+          </a:ln>
+        </p:spPr>
+        <p:style>
+          <a:lnRef idx="1">
+            <a:schemeClr val="accent1"/>
+          </a:lnRef>
+          <a:fillRef idx="0">
+            <a:schemeClr val="accent1"/>
+          </a:fillRef>
+          <a:effectRef idx="0">
+            <a:schemeClr val="accent1"/>
+          </a:effectRef>
+          <a:fontRef idx="minor">
+            <a:schemeClr val="tx1"/>
+          </a:fontRef>
+        </p:style>
+      </p:cxnSp>
+      <p:pic>
+        <p:nvPicPr>
+          <p:cNvPr id="28" name="Graphic 27">
+            <a:extLst>
+              <a:ext uri="{FF2B5EF4-FFF2-40B4-BE49-F238E27FC236}">
+                <a16:creationId xmlns:a16="http://schemas.microsoft.com/office/drawing/2014/main" id="{0DCB895D-56A7-AE45-A666-16602F05AA2C}"/>
+              </a:ext>
+            </a:extLst>
+          </p:cNvPr>
+          <p:cNvPicPr>
+            <a:picLocks noChangeAspect="1"/>
+          </p:cNvPicPr>
+          <p:nvPr/>
+        </p:nvPicPr>
+        <p:blipFill>
+          <a:blip r:embed="rId5">
+            <a:extLst>
+              <a:ext uri="{96DAC541-7B7A-43D3-8B79-37D633B846F1}">
+                <asvg:svgBlip xmlns:asvg="http://schemas.microsoft.com/office/drawing/2016/SVG/main" r:embed="rId6"/>
+              </a:ext>
+            </a:extLst>
+          </a:blip>
+          <a:stretch>
+            <a:fillRect/>
+          </a:stretch>
+        </p:blipFill>
+        <p:spPr>
+          <a:xfrm>
+            <a:off x="4999691" y="4042318"/>
+            <a:ext cx="711200" cy="711200"/>
+          </a:xfrm>
+          <a:prstGeom prst="rect">
+            <a:avLst/>
+          </a:prstGeom>
+        </p:spPr>
+      </p:pic>
+      <p:sp>
+        <p:nvSpPr>
+          <p:cNvPr id="29" name="TextBox 28">
+            <a:extLst>
+              <a:ext uri="{FF2B5EF4-FFF2-40B4-BE49-F238E27FC236}">
+                <a16:creationId xmlns:a16="http://schemas.microsoft.com/office/drawing/2014/main" id="{BFDAA403-99EF-F944-9302-84D5F7DC6B8A}"/>
+              </a:ext>
+            </a:extLst>
+          </p:cNvPr>
+          <p:cNvSpPr txBox="1"/>
+          <p:nvPr/>
+        </p:nvSpPr>
+        <p:spPr>
+          <a:xfrm>
+            <a:off x="4645000" y="4878285"/>
+            <a:ext cx="1353256" cy="646331"/>
+          </a:xfrm>
+          <a:prstGeom prst="rect">
+            <a:avLst/>
+          </a:prstGeom>
+          <a:noFill/>
+        </p:spPr>
+        <p:txBody>
+          <a:bodyPr wrap="none" rtlCol="0">
+            <a:spAutoFit/>
+          </a:bodyPr>
+          <a:lstStyle/>
+          <a:p>
+            <a:pPr algn="ctr"/>
+            <a:r>
+              <a:rPr lang="en-US" sz="1200">
+                <a:latin typeface="IBM Plex Sans" panose="020B0503050203000203" pitchFamily="34" charset="0"/>
+              </a:rPr>
+              <a:t>Soda database </a:t>
+            </a:r>
+          </a:p>
+          <a:p>
+            <a:pPr algn="ctr"/>
+            <a:r>
+              <a:rPr lang="en-US" sz="1200">
+                <a:latin typeface="IBM Plex Sans" panose="020B0503050203000203" pitchFamily="34" charset="0"/>
+              </a:rPr>
+              <a:t>on</a:t>
+            </a:r>
+          </a:p>
+          <a:p>
+            <a:pPr algn="ctr"/>
+            <a:r>
+              <a:rPr lang="en-US" sz="1200">
+                <a:latin typeface="IBM Plex Sans" panose="020B0503050203000203" pitchFamily="34" charset="0"/>
+              </a:rPr>
+              <a:t>AWS RDS MySQL</a:t>
+            </a:r>
+          </a:p>
+        </p:txBody>
+      </p:sp>
+      <p:pic>
+        <p:nvPicPr>
+          <p:cNvPr id="31" name="Graphic 30">
+            <a:extLst>
+              <a:ext uri="{FF2B5EF4-FFF2-40B4-BE49-F238E27FC236}">
+                <a16:creationId xmlns:a16="http://schemas.microsoft.com/office/drawing/2014/main" id="{89A6C67D-06C8-AE49-9CC6-1FDBD62BFEAC}"/>
+              </a:ext>
+            </a:extLst>
+          </p:cNvPr>
+          <p:cNvPicPr>
+            <a:picLocks noChangeAspect="1"/>
+          </p:cNvPicPr>
+          <p:nvPr/>
+        </p:nvPicPr>
+        <p:blipFill>
+          <a:blip r:embed="rId7">
+            <a:extLst>
+              <a:ext uri="{96DAC541-7B7A-43D3-8B79-37D633B846F1}">
+                <asvg:svgBlip xmlns:asvg="http://schemas.microsoft.com/office/drawing/2016/SVG/main" r:embed="rId8"/>
+              </a:ext>
+            </a:extLst>
+          </a:blip>
+          <a:stretch>
+            <a:fillRect/>
+          </a:stretch>
+        </p:blipFill>
+        <p:spPr>
+          <a:xfrm>
+            <a:off x="7754810" y="4042318"/>
+            <a:ext cx="711200" cy="711200"/>
+          </a:xfrm>
+          <a:prstGeom prst="rect">
+            <a:avLst/>
+          </a:prstGeom>
+        </p:spPr>
+      </p:pic>
+      <p:sp>
+        <p:nvSpPr>
+          <p:cNvPr id="34" name="TextBox 33">
+            <a:extLst>
+              <a:ext uri="{FF2B5EF4-FFF2-40B4-BE49-F238E27FC236}">
+                <a16:creationId xmlns:a16="http://schemas.microsoft.com/office/drawing/2014/main" id="{9D55863C-E2EA-FF44-9B09-5ED4698C94F2}"/>
+              </a:ext>
+            </a:extLst>
+          </p:cNvPr>
+          <p:cNvSpPr txBox="1"/>
+          <p:nvPr/>
+        </p:nvSpPr>
+        <p:spPr>
+          <a:xfrm>
+            <a:off x="3085391" y="2211171"/>
+            <a:ext cx="1353255" cy="461665"/>
+          </a:xfrm>
+          <a:prstGeom prst="rect">
+            <a:avLst/>
+          </a:prstGeom>
+          <a:noFill/>
+        </p:spPr>
+        <p:txBody>
+          <a:bodyPr wrap="none" rtlCol="0">
+            <a:spAutoFit/>
+          </a:bodyPr>
+          <a:lstStyle/>
+          <a:p>
+            <a:pPr algn="ctr"/>
+            <a:r>
+              <a:rPr lang="en-US" sz="1200">
+                <a:latin typeface="IBM Plex Sans" panose="020B0503050203000203" pitchFamily="34" charset="0"/>
+              </a:rPr>
+              <a:t>AWS application </a:t>
+            </a:r>
+          </a:p>
+          <a:p>
+            <a:pPr algn="ctr"/>
+            <a:r>
+              <a:rPr lang="en-US" sz="1200">
+                <a:latin typeface="IBM Plex Sans" panose="020B0503050203000203" pitchFamily="34" charset="0"/>
+              </a:rPr>
+              <a:t>load balancer</a:t>
+            </a:r>
+          </a:p>
+        </p:txBody>
+      </p:sp>
+      <p:pic>
+        <p:nvPicPr>
+          <p:cNvPr id="36" name="Graphic 35">
+            <a:extLst>
+              <a:ext uri="{FF2B5EF4-FFF2-40B4-BE49-F238E27FC236}">
+                <a16:creationId xmlns:a16="http://schemas.microsoft.com/office/drawing/2014/main" id="{C6907054-198B-044B-A9F1-0644308F9940}"/>
+              </a:ext>
+            </a:extLst>
+          </p:cNvPr>
+          <p:cNvPicPr>
+            <a:picLocks noChangeAspect="1"/>
+          </p:cNvPicPr>
+          <p:nvPr/>
+        </p:nvPicPr>
+        <p:blipFill>
+          <a:blip r:embed="rId9">
+            <a:extLst>
+              <a:ext uri="{96DAC541-7B7A-43D3-8B79-37D633B846F1}">
+                <asvg:svgBlip xmlns:asvg="http://schemas.microsoft.com/office/drawing/2016/SVG/main" r:embed="rId10"/>
+              </a:ext>
+            </a:extLst>
+          </a:blip>
+          <a:stretch>
+            <a:fillRect/>
+          </a:stretch>
+        </p:blipFill>
+        <p:spPr>
+          <a:xfrm>
+            <a:off x="5355291" y="2672244"/>
+            <a:ext cx="449723" cy="469900"/>
+          </a:xfrm>
+          <a:prstGeom prst="rect">
+            <a:avLst/>
+          </a:prstGeom>
+        </p:spPr>
+      </p:pic>
+      <p:sp>
+        <p:nvSpPr>
+          <p:cNvPr id="37" name="TextBox 36">
+            <a:extLst>
+              <a:ext uri="{FF2B5EF4-FFF2-40B4-BE49-F238E27FC236}">
+                <a16:creationId xmlns:a16="http://schemas.microsoft.com/office/drawing/2014/main" id="{25552A11-FEA0-9040-8FC3-4E5F8C975593}"/>
+              </a:ext>
+            </a:extLst>
+          </p:cNvPr>
+          <p:cNvSpPr txBox="1"/>
+          <p:nvPr/>
+        </p:nvSpPr>
+        <p:spPr>
+          <a:xfrm>
+            <a:off x="5110676" y="3109007"/>
+            <a:ext cx="2618024" cy="276999"/>
+          </a:xfrm>
+          <a:prstGeom prst="rect">
+            <a:avLst/>
+          </a:prstGeom>
+          <a:noFill/>
+        </p:spPr>
+        <p:txBody>
+          <a:bodyPr wrap="none" rtlCol="0">
+            <a:spAutoFit/>
+          </a:bodyPr>
+          <a:lstStyle/>
+          <a:p>
+            <a:r>
+              <a:rPr lang="en-US" sz="1200">
+                <a:latin typeface="IBM Plex Sans" panose="020B0503050203000203" pitchFamily="34" charset="0"/>
+              </a:rPr>
+              <a:t>Soda application docker containers</a:t>
+            </a:r>
+          </a:p>
+        </p:txBody>
+      </p:sp>
+      <p:sp>
+        <p:nvSpPr>
+          <p:cNvPr id="38" name="TextBox 37">
+            <a:extLst>
+              <a:ext uri="{FF2B5EF4-FFF2-40B4-BE49-F238E27FC236}">
+                <a16:creationId xmlns:a16="http://schemas.microsoft.com/office/drawing/2014/main" id="{A972982B-0D82-3C42-9218-FF0DBAD64323}"/>
+              </a:ext>
+            </a:extLst>
+          </p:cNvPr>
+          <p:cNvSpPr txBox="1"/>
+          <p:nvPr/>
+        </p:nvSpPr>
+        <p:spPr>
+          <a:xfrm>
+            <a:off x="5936623" y="2211171"/>
+            <a:ext cx="1075936" cy="276999"/>
+          </a:xfrm>
+          <a:prstGeom prst="rect">
+            <a:avLst/>
+          </a:prstGeom>
+          <a:noFill/>
+        </p:spPr>
+        <p:txBody>
+          <a:bodyPr wrap="none" rtlCol="0">
+            <a:spAutoFit/>
+          </a:bodyPr>
+          <a:lstStyle/>
+          <a:p>
+            <a:pPr algn="ctr"/>
+            <a:r>
+              <a:rPr lang="en-US" sz="1200">
+                <a:latin typeface="IBM Plex Sans" panose="020B0503050203000203" pitchFamily="34" charset="0"/>
+              </a:rPr>
+              <a:t>AWS Fargate</a:t>
+            </a:r>
+          </a:p>
+        </p:txBody>
+      </p:sp>
+      <p:pic>
+        <p:nvPicPr>
+          <p:cNvPr id="39" name="Graphic 38">
+            <a:extLst>
+              <a:ext uri="{FF2B5EF4-FFF2-40B4-BE49-F238E27FC236}">
+                <a16:creationId xmlns:a16="http://schemas.microsoft.com/office/drawing/2014/main" id="{346F2EF1-5663-F14C-A56D-6F72DBEB7B06}"/>
+              </a:ext>
+            </a:extLst>
+          </p:cNvPr>
+          <p:cNvPicPr>
+            <a:picLocks noChangeAspect="1"/>
+          </p:cNvPicPr>
+          <p:nvPr/>
+        </p:nvPicPr>
+        <p:blipFill>
+          <a:blip r:embed="rId9">
+            <a:extLst>
+              <a:ext uri="{96DAC541-7B7A-43D3-8B79-37D633B846F1}">
+                <asvg:svgBlip xmlns:asvg="http://schemas.microsoft.com/office/drawing/2016/SVG/main" r:embed="rId10"/>
+              </a:ext>
+            </a:extLst>
+          </a:blip>
+          <a:stretch>
+            <a:fillRect/>
+          </a:stretch>
+        </p:blipFill>
+        <p:spPr>
+          <a:xfrm>
+            <a:off x="6103254" y="2672244"/>
+            <a:ext cx="449723" cy="469900"/>
+          </a:xfrm>
+          <a:prstGeom prst="rect">
+            <a:avLst/>
+          </a:prstGeom>
+        </p:spPr>
+      </p:pic>
+      <p:pic>
+        <p:nvPicPr>
+          <p:cNvPr id="40" name="Graphic 39">
+            <a:extLst>
+              <a:ext uri="{FF2B5EF4-FFF2-40B4-BE49-F238E27FC236}">
+                <a16:creationId xmlns:a16="http://schemas.microsoft.com/office/drawing/2014/main" id="{A22C50A5-7DB5-8243-9C8A-D7F8A423DBDF}"/>
+              </a:ext>
+            </a:extLst>
+          </p:cNvPr>
+          <p:cNvPicPr>
+            <a:picLocks noChangeAspect="1"/>
+          </p:cNvPicPr>
+          <p:nvPr/>
+        </p:nvPicPr>
+        <p:blipFill>
+          <a:blip r:embed="rId9">
+            <a:extLst>
+              <a:ext uri="{96DAC541-7B7A-43D3-8B79-37D633B846F1}">
+                <asvg:svgBlip xmlns:asvg="http://schemas.microsoft.com/office/drawing/2016/SVG/main" r:embed="rId10"/>
+              </a:ext>
+            </a:extLst>
+          </a:blip>
+          <a:stretch>
+            <a:fillRect/>
+          </a:stretch>
+        </p:blipFill>
+        <p:spPr>
+          <a:xfrm>
+            <a:off x="6822170" y="2672244"/>
+            <a:ext cx="449723" cy="469900"/>
+          </a:xfrm>
+          <a:prstGeom prst="rect">
+            <a:avLst/>
+          </a:prstGeom>
+        </p:spPr>
+      </p:pic>
+      <p:sp>
+        <p:nvSpPr>
+          <p:cNvPr id="41" name="Rectangle 40">
+            <a:extLst>
+              <a:ext uri="{FF2B5EF4-FFF2-40B4-BE49-F238E27FC236}">
+                <a16:creationId xmlns:a16="http://schemas.microsoft.com/office/drawing/2014/main" id="{56EB468A-1205-D448-8311-045F0B77A8E9}"/>
+              </a:ext>
+            </a:extLst>
+          </p:cNvPr>
+          <p:cNvSpPr/>
+          <p:nvPr/>
+        </p:nvSpPr>
+        <p:spPr>
+          <a:xfrm>
+            <a:off x="5017676" y="2510524"/>
+            <a:ext cx="2753043" cy="1044064"/>
+          </a:xfrm>
+          <a:prstGeom prst="rect">
+            <a:avLst/>
+          </a:prstGeom>
+          <a:noFill/>
+          <a:ln>
+            <a:solidFill>
+              <a:schemeClr val="bg1">
+                <a:lumMod val="50000"/>
+              </a:schemeClr>
+            </a:solidFill>
+            <a:prstDash val="lgDash"/>
+          </a:ln>
+        </p:spPr>
+        <p:style>
+          <a:lnRef idx="2">
+            <a:schemeClr val="accent1">
+              <a:shade val="50000"/>
+            </a:schemeClr>
+          </a:lnRef>
+          <a:fillRef idx="1">
+            <a:schemeClr val="accent1"/>
+          </a:fillRef>
+          <a:effectRef idx="0">
+            <a:schemeClr val="accent1"/>
+          </a:effectRef>
+          <a:fontRef idx="minor">
+            <a:schemeClr val="lt1"/>
+          </a:fontRef>
+        </p:style>
+        <p:txBody>
+          <a:bodyPr rot="0" spcFirstLastPara="0" vertOverflow="overflow" horzOverflow="overflow" vert="horz" wrap="square" lIns="91440" tIns="45720" rIns="91440" bIns="45720" numCol="1" spcCol="0" rtlCol="0" fromWordArt="0" anchor="ctr" anchorCtr="0" forceAA="0" compatLnSpc="1">
+            <a:prstTxWarp prst="textNoShape">
+              <a:avLst/>
+            </a:prstTxWarp>
+            <a:noAutofit/>
+          </a:bodyPr>
+          <a:lstStyle/>
+          <a:p>
+            <a:pPr algn="ctr"/>
+            <a:endParaRPr lang="en-US">
+              <a:solidFill>
+                <a:schemeClr val="tx1"/>
+              </a:solidFill>
+              <a:latin typeface="IBM Plex Sans Medium" panose="020B0503050203000203" pitchFamily="34" charset="0"/>
+            </a:endParaRPr>
+          </a:p>
+        </p:txBody>
+      </p:sp>
+      <p:cxnSp>
+        <p:nvCxnSpPr>
+          <p:cNvPr id="44" name="Straight Arrow Connector 43">
+            <a:extLst>
+              <a:ext uri="{FF2B5EF4-FFF2-40B4-BE49-F238E27FC236}">
+                <a16:creationId xmlns:a16="http://schemas.microsoft.com/office/drawing/2014/main" id="{DBEC793B-F703-B045-BF1D-DF14B9D4CAA8}"/>
+              </a:ext>
+            </a:extLst>
+          </p:cNvPr>
+          <p:cNvCxnSpPr>
+            <a:cxnSpLocks/>
+          </p:cNvCxnSpPr>
+          <p:nvPr/>
+        </p:nvCxnSpPr>
+        <p:spPr>
+          <a:xfrm>
+            <a:off x="4215021" y="3013847"/>
+            <a:ext cx="566051" cy="1"/>
+          </a:xfrm>
+          <a:prstGeom prst="straightConnector1">
+            <a:avLst/>
+          </a:prstGeom>
+          <a:ln w="12700">
+            <a:solidFill>
+              <a:schemeClr val="bg1">
+                <a:lumMod val="50000"/>
+              </a:schemeClr>
+            </a:solidFill>
+            <a:headEnd type="none"/>
+            <a:tailEnd type="arrow" w="lg" len="lg"/>
+          </a:ln>
+        </p:spPr>
+        <p:style>
+          <a:lnRef idx="1">
+            <a:schemeClr val="accent1"/>
+          </a:lnRef>
+          <a:fillRef idx="0">
+            <a:schemeClr val="accent1"/>
+          </a:fillRef>
+          <a:effectRef idx="0">
+            <a:schemeClr val="accent1"/>
+          </a:effectRef>
+          <a:fontRef idx="minor">
+            <a:schemeClr val="tx1"/>
+          </a:fontRef>
+        </p:style>
+      </p:cxnSp>
+      <p:pic>
+        <p:nvPicPr>
+          <p:cNvPr id="45" name="Graphic 44">
+            <a:extLst>
+              <a:ext uri="{FF2B5EF4-FFF2-40B4-BE49-F238E27FC236}">
+                <a16:creationId xmlns:a16="http://schemas.microsoft.com/office/drawing/2014/main" id="{2A243C83-D0B3-C14E-84AF-E3AB09320C47}"/>
+              </a:ext>
+            </a:extLst>
+          </p:cNvPr>
+          <p:cNvPicPr>
+            <a:picLocks noChangeAspect="1"/>
+          </p:cNvPicPr>
+          <p:nvPr/>
+        </p:nvPicPr>
+        <p:blipFill>
+          <a:blip r:embed="rId11">
+            <a:extLst>
+              <a:ext uri="{96DAC541-7B7A-43D3-8B79-37D633B846F1}">
+                <asvg:svgBlip xmlns:asvg="http://schemas.microsoft.com/office/drawing/2016/SVG/main" r:embed="rId12"/>
+              </a:ext>
+            </a:extLst>
+          </a:blip>
+          <a:stretch>
+            <a:fillRect/>
+          </a:stretch>
+        </p:blipFill>
+        <p:spPr>
+          <a:xfrm>
+            <a:off x="5250399" y="1929466"/>
+            <a:ext cx="711200" cy="711200"/>
+          </a:xfrm>
+          <a:prstGeom prst="rect">
+            <a:avLst/>
+          </a:prstGeom>
+        </p:spPr>
+      </p:pic>
+      <p:sp>
+        <p:nvSpPr>
+          <p:cNvPr id="46" name="TextBox 45">
+            <a:extLst>
+              <a:ext uri="{FF2B5EF4-FFF2-40B4-BE49-F238E27FC236}">
+                <a16:creationId xmlns:a16="http://schemas.microsoft.com/office/drawing/2014/main" id="{5DAE6FE6-F903-5D4E-98EA-ED14FE765FC5}"/>
+              </a:ext>
+            </a:extLst>
+          </p:cNvPr>
+          <p:cNvSpPr txBox="1"/>
+          <p:nvPr/>
+        </p:nvSpPr>
+        <p:spPr>
+          <a:xfrm>
+            <a:off x="7634539" y="4878285"/>
+            <a:ext cx="1005403" cy="646331"/>
+          </a:xfrm>
+          <a:prstGeom prst="rect">
+            <a:avLst/>
+          </a:prstGeom>
+          <a:noFill/>
+        </p:spPr>
+        <p:txBody>
+          <a:bodyPr wrap="none" rtlCol="0">
+            <a:spAutoFit/>
+          </a:bodyPr>
+          <a:lstStyle/>
+          <a:p>
+            <a:pPr algn="ctr"/>
+            <a:r>
+              <a:rPr lang="en-US" sz="1200">
+                <a:latin typeface="IBM Plex Sans" panose="020B0503050203000203" pitchFamily="34" charset="0"/>
+              </a:rPr>
+              <a:t>Soda Spark </a:t>
+            </a:r>
+          </a:p>
+          <a:p>
+            <a:pPr algn="ctr"/>
+            <a:r>
+              <a:rPr lang="en-US" sz="1200">
+                <a:latin typeface="IBM Plex Sans" panose="020B0503050203000203" pitchFamily="34" charset="0"/>
+              </a:rPr>
+              <a:t>on</a:t>
+            </a:r>
+          </a:p>
+          <a:p>
+            <a:pPr algn="ctr"/>
+            <a:r>
+              <a:rPr lang="en-US" sz="1200">
+                <a:latin typeface="IBM Plex Sans" panose="020B0503050203000203" pitchFamily="34" charset="0"/>
+              </a:rPr>
+              <a:t>AWS EMR</a:t>
+            </a:r>
+          </a:p>
+        </p:txBody>
+      </p:sp>
+      <p:sp>
+        <p:nvSpPr>
+          <p:cNvPr id="47" name="TextBox 46">
+            <a:extLst>
+              <a:ext uri="{FF2B5EF4-FFF2-40B4-BE49-F238E27FC236}">
+                <a16:creationId xmlns:a16="http://schemas.microsoft.com/office/drawing/2014/main" id="{C31A8720-DC27-284F-B121-4643D11EB1ED}"/>
+              </a:ext>
+            </a:extLst>
+          </p:cNvPr>
+          <p:cNvSpPr txBox="1"/>
+          <p:nvPr/>
+        </p:nvSpPr>
+        <p:spPr>
+          <a:xfrm>
+            <a:off x="10064518" y="1953279"/>
+            <a:ext cx="917239" cy="646331"/>
+          </a:xfrm>
+          <a:prstGeom prst="rect">
+            <a:avLst/>
+          </a:prstGeom>
+          <a:noFill/>
+        </p:spPr>
+        <p:txBody>
+          <a:bodyPr wrap="none" rtlCol="0">
+            <a:spAutoFit/>
+          </a:bodyPr>
+          <a:lstStyle/>
+          <a:p>
+            <a:pPr algn="ctr"/>
+            <a:r>
+              <a:rPr lang="en-US" sz="1200">
+                <a:latin typeface="IBM Plex Sans" panose="020B0503050203000203" pitchFamily="34" charset="0"/>
+              </a:rPr>
+              <a:t>Soda file </a:t>
+            </a:r>
+          </a:p>
+          <a:p>
+            <a:pPr algn="ctr"/>
+            <a:r>
+              <a:rPr lang="en-US" sz="1200">
+                <a:latin typeface="IBM Plex Sans" panose="020B0503050203000203" pitchFamily="34" charset="0"/>
+              </a:rPr>
+              <a:t>storage on</a:t>
+            </a:r>
+          </a:p>
+          <a:p>
+            <a:pPr algn="ctr"/>
+            <a:r>
+              <a:rPr lang="en-US" sz="1200">
+                <a:latin typeface="IBM Plex Sans" panose="020B0503050203000203" pitchFamily="34" charset="0"/>
+              </a:rPr>
+              <a:t>AWS S3</a:t>
+            </a:r>
+          </a:p>
+        </p:txBody>
+      </p:sp>
+      <p:sp>
+        <p:nvSpPr>
+          <p:cNvPr id="48" name="TextBox 47">
+            <a:extLst>
+              <a:ext uri="{FF2B5EF4-FFF2-40B4-BE49-F238E27FC236}">
+                <a16:creationId xmlns:a16="http://schemas.microsoft.com/office/drawing/2014/main" id="{577FE397-8213-A141-9964-1B93E2A8D613}"/>
+              </a:ext>
+            </a:extLst>
+          </p:cNvPr>
+          <p:cNvSpPr txBox="1"/>
+          <p:nvPr/>
+        </p:nvSpPr>
+        <p:spPr>
+          <a:xfrm>
+            <a:off x="6103254" y="4878284"/>
+            <a:ext cx="1370888" cy="830997"/>
+          </a:xfrm>
+          <a:prstGeom prst="rect">
+            <a:avLst/>
+          </a:prstGeom>
+          <a:noFill/>
+        </p:spPr>
+        <p:txBody>
+          <a:bodyPr wrap="none" rtlCol="0">
+            <a:spAutoFit/>
+          </a:bodyPr>
+          <a:lstStyle/>
+          <a:p>
+            <a:pPr algn="ctr"/>
+            <a:r>
+              <a:rPr lang="en-US" sz="1200">
+                <a:latin typeface="IBM Plex Sans" panose="020B0503050203000203" pitchFamily="34" charset="0"/>
+              </a:rPr>
+              <a:t>Soda logs </a:t>
+            </a:r>
+          </a:p>
+          <a:p>
+            <a:pPr algn="ctr"/>
+            <a:r>
+              <a:rPr lang="en-US" sz="1200">
+                <a:latin typeface="IBM Plex Sans" panose="020B0503050203000203" pitchFamily="34" charset="0"/>
+              </a:rPr>
+              <a:t>on</a:t>
+            </a:r>
+          </a:p>
+          <a:p>
+            <a:pPr algn="ctr"/>
+            <a:r>
+              <a:rPr lang="en-US" sz="1200">
+                <a:latin typeface="IBM Plex Sans" panose="020B0503050203000203" pitchFamily="34" charset="0"/>
+              </a:rPr>
+              <a:t>AWS Cloudwatch</a:t>
+            </a:r>
+          </a:p>
+          <a:p>
+            <a:pPr algn="ctr"/>
+            <a:r>
+              <a:rPr lang="en-US" sz="1200">
+                <a:latin typeface="IBM Plex Sans" panose="020B0503050203000203" pitchFamily="34" charset="0"/>
+              </a:rPr>
+              <a:t>&amp; Datadog</a:t>
+            </a:r>
+          </a:p>
+        </p:txBody>
+      </p:sp>
+      <p:pic>
+        <p:nvPicPr>
+          <p:cNvPr id="51" name="Graphic 50">
+            <a:extLst>
+              <a:ext uri="{FF2B5EF4-FFF2-40B4-BE49-F238E27FC236}">
+                <a16:creationId xmlns:a16="http://schemas.microsoft.com/office/drawing/2014/main" id="{2056E054-B38D-2A4D-AE0E-97064A6CB770}"/>
+              </a:ext>
+            </a:extLst>
+          </p:cNvPr>
+          <p:cNvPicPr>
+            <a:picLocks noChangeAspect="1"/>
+          </p:cNvPicPr>
+          <p:nvPr/>
+        </p:nvPicPr>
+        <p:blipFill>
+          <a:blip r:embed="rId13">
+            <a:extLst>
+              <a:ext uri="{96DAC541-7B7A-43D3-8B79-37D633B846F1}">
+                <asvg:svgBlip xmlns:asvg="http://schemas.microsoft.com/office/drawing/2016/SVG/main" r:embed="rId14"/>
+              </a:ext>
+            </a:extLst>
+          </a:blip>
+          <a:stretch>
+            <a:fillRect/>
+          </a:stretch>
+        </p:blipFill>
+        <p:spPr>
+          <a:xfrm>
+            <a:off x="6433098" y="4042318"/>
+            <a:ext cx="711200" cy="711200"/>
+          </a:xfrm>
+          <a:prstGeom prst="rect">
+            <a:avLst/>
+          </a:prstGeom>
+        </p:spPr>
+      </p:pic>
+      <p:pic>
+        <p:nvPicPr>
+          <p:cNvPr id="52" name="Graphic 51">
+            <a:extLst>
+              <a:ext uri="{FF2B5EF4-FFF2-40B4-BE49-F238E27FC236}">
+                <a16:creationId xmlns:a16="http://schemas.microsoft.com/office/drawing/2014/main" id="{88C9894B-136F-A640-AEA9-B759E755F54F}"/>
+              </a:ext>
+            </a:extLst>
+          </p:cNvPr>
+          <p:cNvPicPr>
+            <a:picLocks noChangeAspect="1"/>
+          </p:cNvPicPr>
+          <p:nvPr/>
+        </p:nvPicPr>
+        <p:blipFill>
+          <a:blip r:embed="rId15">
+            <a:extLst>
+              <a:ext uri="{96DAC541-7B7A-43D3-8B79-37D633B846F1}">
+                <asvg:svgBlip xmlns:asvg="http://schemas.microsoft.com/office/drawing/2016/SVG/main" r:embed="rId16"/>
+              </a:ext>
+            </a:extLst>
+          </a:blip>
+          <a:stretch>
+            <a:fillRect/>
+          </a:stretch>
+        </p:blipFill>
+        <p:spPr>
+          <a:xfrm>
+            <a:off x="10167540" y="4042318"/>
+            <a:ext cx="711200" cy="711200"/>
+          </a:xfrm>
+          <a:prstGeom prst="rect">
+            <a:avLst/>
+          </a:prstGeom>
+        </p:spPr>
+      </p:pic>
+      <p:pic>
+        <p:nvPicPr>
+          <p:cNvPr id="53" name="Graphic 52">
+            <a:extLst>
+              <a:ext uri="{FF2B5EF4-FFF2-40B4-BE49-F238E27FC236}">
+                <a16:creationId xmlns:a16="http://schemas.microsoft.com/office/drawing/2014/main" id="{3C3AA05F-88AB-3D4F-A0C2-F50F0C99DDD2}"/>
+              </a:ext>
+            </a:extLst>
+          </p:cNvPr>
+          <p:cNvPicPr>
+            <a:picLocks noChangeAspect="1"/>
+          </p:cNvPicPr>
+          <p:nvPr/>
+        </p:nvPicPr>
+        <p:blipFill>
+          <a:blip r:embed="rId15">
+            <a:extLst>
+              <a:ext uri="{96DAC541-7B7A-43D3-8B79-37D633B846F1}">
+                <asvg:svgBlip xmlns:asvg="http://schemas.microsoft.com/office/drawing/2016/SVG/main" r:embed="rId16"/>
+              </a:ext>
+            </a:extLst>
+          </a:blip>
+          <a:stretch>
+            <a:fillRect/>
+          </a:stretch>
+        </p:blipFill>
+        <p:spPr>
+          <a:xfrm>
+            <a:off x="10167540" y="2649454"/>
+            <a:ext cx="711200" cy="711200"/>
+          </a:xfrm>
+          <a:prstGeom prst="rect">
+            <a:avLst/>
+          </a:prstGeom>
+        </p:spPr>
+      </p:pic>
+      <p:sp>
+        <p:nvSpPr>
+          <p:cNvPr id="54" name="TextBox 53">
+            <a:extLst>
+              <a:ext uri="{FF2B5EF4-FFF2-40B4-BE49-F238E27FC236}">
+                <a16:creationId xmlns:a16="http://schemas.microsoft.com/office/drawing/2014/main" id="{CA5BADA5-6FE9-3041-BEC2-4A76B17649AE}"/>
+              </a:ext>
+            </a:extLst>
+          </p:cNvPr>
+          <p:cNvSpPr txBox="1"/>
+          <p:nvPr/>
+        </p:nvSpPr>
+        <p:spPr>
+          <a:xfrm>
+            <a:off x="9712550" y="4850472"/>
+            <a:ext cx="1691489" cy="276999"/>
+          </a:xfrm>
+          <a:prstGeom prst="rect">
+            <a:avLst/>
+          </a:prstGeom>
+          <a:noFill/>
+        </p:spPr>
+        <p:txBody>
+          <a:bodyPr wrap="none" rtlCol="0">
+            <a:spAutoFit/>
+          </a:bodyPr>
+          <a:lstStyle/>
+          <a:p>
+            <a:pPr algn="ctr"/>
+            <a:r>
+              <a:rPr lang="en-US" sz="1200">
+                <a:latin typeface="IBM Plex Sans" panose="020B0503050203000203" pitchFamily="34" charset="0"/>
+              </a:rPr>
+              <a:t>Client data lake on S3</a:t>
+            </a:r>
+          </a:p>
+        </p:txBody>
+      </p:sp>
+      <p:cxnSp>
+        <p:nvCxnSpPr>
+          <p:cNvPr id="55" name="Straight Arrow Connector 54">
+            <a:extLst>
+              <a:ext uri="{FF2B5EF4-FFF2-40B4-BE49-F238E27FC236}">
+                <a16:creationId xmlns:a16="http://schemas.microsoft.com/office/drawing/2014/main" id="{0DECFEBC-B2D7-784F-9748-4825481E1680}"/>
+              </a:ext>
+            </a:extLst>
+          </p:cNvPr>
+          <p:cNvCxnSpPr>
+            <a:cxnSpLocks/>
+          </p:cNvCxnSpPr>
+          <p:nvPr/>
+        </p:nvCxnSpPr>
+        <p:spPr>
+          <a:xfrm flipH="1">
+            <a:off x="8015334" y="3013847"/>
+            <a:ext cx="2001738" cy="0"/>
+          </a:xfrm>
+          <a:prstGeom prst="straightConnector1">
+            <a:avLst/>
+          </a:prstGeom>
+          <a:ln w="12700">
+            <a:solidFill>
+              <a:schemeClr val="bg1">
+                <a:lumMod val="50000"/>
+              </a:schemeClr>
+            </a:solidFill>
+            <a:headEnd type="none"/>
+            <a:tailEnd type="arrow" w="lg" len="lg"/>
+          </a:ln>
+        </p:spPr>
+        <p:style>
+          <a:lnRef idx="1">
+            <a:schemeClr val="accent1"/>
+          </a:lnRef>
+          <a:fillRef idx="0">
+            <a:schemeClr val="accent1"/>
+          </a:fillRef>
+          <a:effectRef idx="0">
+            <a:schemeClr val="accent1"/>
+          </a:effectRef>
+          <a:fontRef idx="minor">
+            <a:schemeClr val="tx1"/>
+          </a:fontRef>
+        </p:style>
+      </p:cxnSp>
+      <p:cxnSp>
+        <p:nvCxnSpPr>
+          <p:cNvPr id="57" name="Straight Arrow Connector 56">
+            <a:extLst>
+              <a:ext uri="{FF2B5EF4-FFF2-40B4-BE49-F238E27FC236}">
+                <a16:creationId xmlns:a16="http://schemas.microsoft.com/office/drawing/2014/main" id="{1E95AF1E-3B05-994B-AE5A-3C919E09DCC3}"/>
+              </a:ext>
+            </a:extLst>
+          </p:cNvPr>
+          <p:cNvCxnSpPr>
+            <a:cxnSpLocks/>
+          </p:cNvCxnSpPr>
+          <p:nvPr/>
+        </p:nvCxnSpPr>
+        <p:spPr>
+          <a:xfrm flipH="1">
+            <a:off x="8639942" y="4414565"/>
+            <a:ext cx="1377130" cy="0"/>
+          </a:xfrm>
+          <a:prstGeom prst="straightConnector1">
+            <a:avLst/>
+          </a:prstGeom>
+          <a:ln w="12700">
+            <a:solidFill>
+              <a:schemeClr val="bg1">
+                <a:lumMod val="50000"/>
+              </a:schemeClr>
+            </a:solidFill>
+            <a:headEnd type="none"/>
+            <a:tailEnd type="arrow" w="lg" len="lg"/>
+          </a:ln>
+        </p:spPr>
+        <p:style>
+          <a:lnRef idx="1">
+            <a:schemeClr val="accent1"/>
+          </a:lnRef>
+          <a:fillRef idx="0">
+            <a:schemeClr val="accent1"/>
+          </a:fillRef>
+          <a:effectRef idx="0">
+            <a:schemeClr val="accent1"/>
+          </a:effectRef>
+          <a:fontRef idx="minor">
+            <a:schemeClr val="tx1"/>
+          </a:fontRef>
+        </p:style>
+      </p:cxnSp>
+      <p:cxnSp>
+        <p:nvCxnSpPr>
+          <p:cNvPr id="59" name="Straight Arrow Connector 58">
+            <a:extLst>
+              <a:ext uri="{FF2B5EF4-FFF2-40B4-BE49-F238E27FC236}">
+                <a16:creationId xmlns:a16="http://schemas.microsoft.com/office/drawing/2014/main" id="{BDD7AE97-D731-FC4E-867A-AC4739993F11}"/>
+              </a:ext>
+            </a:extLst>
+          </p:cNvPr>
+          <p:cNvCxnSpPr>
+            <a:cxnSpLocks/>
+          </p:cNvCxnSpPr>
+          <p:nvPr/>
+        </p:nvCxnSpPr>
+        <p:spPr>
+          <a:xfrm flipV="1">
+            <a:off x="8639942" y="3360654"/>
+            <a:ext cx="1377130" cy="901511"/>
+          </a:xfrm>
+          <a:prstGeom prst="straightConnector1">
+            <a:avLst/>
+          </a:prstGeom>
+          <a:ln w="12700">
+            <a:solidFill>
+              <a:schemeClr val="bg1">
+                <a:lumMod val="50000"/>
+              </a:schemeClr>
+            </a:solidFill>
+            <a:headEnd type="none"/>
+            <a:tailEnd type="arrow" w="lg" len="lg"/>
+          </a:ln>
+        </p:spPr>
+        <p:style>
+          <a:lnRef idx="1">
+            <a:schemeClr val="accent1"/>
+          </a:lnRef>
+          <a:fillRef idx="0">
+            <a:schemeClr val="accent1"/>
+          </a:fillRef>
+          <a:effectRef idx="0">
+            <a:schemeClr val="accent1"/>
+          </a:effectRef>
+          <a:fontRef idx="minor">
+            <a:schemeClr val="tx1"/>
+          </a:fontRef>
+        </p:style>
+      </p:cxnSp>
+    </p:spTree>
+    <p:extLst>
+      <p:ext uri="{BB962C8B-B14F-4D97-AF65-F5344CB8AC3E}">
+        <p14:creationId xmlns:p14="http://schemas.microsoft.com/office/powerpoint/2010/main" val="2184972057"/>
+      </p:ext>
+    </p:extLst>
+  </p:cSld>
+  <p:clrMapOvr>
+    <a:masterClrMapping/>
+  </p:clrMapOvr>
+</p:sld>
+</file>
+
+<file path=ppt/slides/slide3.xml><?xml version="1.0" encoding="utf-8"?>
+<p:sld xmlns:a="http://schemas.openxmlformats.org/drawingml/2006/main" xmlns:r="http://schemas.openxmlformats.org/officeDocument/2006/relationships" xmlns:p="http://schemas.openxmlformats.org/presentationml/2006/main">
+  <p:cSld>
+    <p:spTree>
+      <p:nvGrpSpPr>
+        <p:cNvPr id="1" name=""/>
+        <p:cNvGrpSpPr/>
+        <p:nvPr/>
+      </p:nvGrpSpPr>
+      <p:grpSpPr>
+        <a:xfrm>
+          <a:off x="0" y="0"/>
+          <a:ext cx="0" cy="0"/>
+          <a:chOff x="0" y="0"/>
+          <a:chExt cx="0" cy="0"/>
+        </a:xfrm>
+      </p:grpSpPr>
+      <p:sp>
+        <p:nvSpPr>
+          <p:cNvPr id="2" name="Title 1">
+            <a:extLst>
+              <a:ext uri="{FF2B5EF4-FFF2-40B4-BE49-F238E27FC236}">
+                <a16:creationId xmlns:a16="http://schemas.microsoft.com/office/drawing/2014/main" id="{8628C714-C54C-5140-935B-F0682F9B6E46}"/>
+              </a:ext>
+            </a:extLst>
+          </p:cNvPr>
+          <p:cNvSpPr>
+            <a:spLocks noGrp="1"/>
+          </p:cNvSpPr>
+          <p:nvPr>
+            <p:ph type="title"/>
+          </p:nvPr>
+        </p:nvSpPr>
+        <p:spPr/>
+        <p:txBody>
+          <a:bodyPr/>
+          <a:lstStyle/>
+          <a:p>
+            <a:endParaRPr lang="en-US"/>
+          </a:p>
+        </p:txBody>
+      </p:sp>
+      <p:sp>
+        <p:nvSpPr>
+          <p:cNvPr id="3" name="Content Placeholder 2">
+            <a:extLst>
+              <a:ext uri="{FF2B5EF4-FFF2-40B4-BE49-F238E27FC236}">
+                <a16:creationId xmlns:a16="http://schemas.microsoft.com/office/drawing/2014/main" id="{8B0FDDF2-9879-574B-851E-8E2134340BF2}"/>
+              </a:ext>
+            </a:extLst>
+          </p:cNvPr>
+          <p:cNvSpPr>
+            <a:spLocks noGrp="1"/>
+          </p:cNvSpPr>
+          <p:nvPr>
+            <p:ph idx="1"/>
+          </p:nvPr>
+        </p:nvSpPr>
+        <p:spPr/>
+        <p:txBody>
+          <a:bodyPr/>
+          <a:lstStyle/>
+          <a:p>
+            <a:endParaRPr lang="en-US"/>
+          </a:p>
+        </p:txBody>
+      </p:sp>
+    </p:spTree>
+    <p:extLst>
+      <p:ext uri="{BB962C8B-B14F-4D97-AF65-F5344CB8AC3E}">
+        <p14:creationId xmlns:p14="http://schemas.microsoft.com/office/powerpoint/2010/main" val="2945251610"/>
       </p:ext>
     </p:extLst>
   </p:cSld>
@@ -4094,7 +5629,89 @@
       </a:bgFillStyleLst>
     </a:fmtScheme>
   </a:themeElements>
-  <a:objectDefaults/>
+  <a:objectDefaults>
+    <a:spDef>
+      <a:spPr>
+        <a:solidFill>
+          <a:srgbClr val="61D597"/>
+        </a:solidFill>
+        <a:ln>
+          <a:noFill/>
+        </a:ln>
+      </a:spPr>
+      <a:bodyPr rtlCol="0" anchor="ctr"/>
+      <a:lstStyle>
+        <a:defPPr algn="ctr">
+          <a:defRPr>
+            <a:solidFill>
+              <a:schemeClr val="tx1"/>
+            </a:solidFill>
+            <a:latin typeface="IBM Plex Sans Medium" panose="020B0503050203000203" pitchFamily="34" charset="0"/>
+          </a:defRPr>
+        </a:defPPr>
+      </a:lstStyle>
+      <a:style>
+        <a:lnRef idx="2">
+          <a:schemeClr val="accent1">
+            <a:shade val="50000"/>
+          </a:schemeClr>
+        </a:lnRef>
+        <a:fillRef idx="1">
+          <a:schemeClr val="accent1"/>
+        </a:fillRef>
+        <a:effectRef idx="0">
+          <a:schemeClr val="accent1"/>
+        </a:effectRef>
+        <a:fontRef idx="minor">
+          <a:schemeClr val="lt1"/>
+        </a:fontRef>
+      </a:style>
+    </a:spDef>
+    <a:lnDef>
+      <a:spPr>
+        <a:ln w="12700">
+          <a:solidFill>
+            <a:schemeClr val="bg1">
+              <a:lumMod val="50000"/>
+            </a:schemeClr>
+          </a:solidFill>
+          <a:headEnd type="none"/>
+          <a:tailEnd type="arrow" w="lg" len="lg"/>
+        </a:ln>
+      </a:spPr>
+      <a:bodyPr/>
+      <a:lstStyle/>
+      <a:style>
+        <a:lnRef idx="1">
+          <a:schemeClr val="accent1"/>
+        </a:lnRef>
+        <a:fillRef idx="0">
+          <a:schemeClr val="accent1"/>
+        </a:fillRef>
+        <a:effectRef idx="0">
+          <a:schemeClr val="accent1"/>
+        </a:effectRef>
+        <a:fontRef idx="minor">
+          <a:schemeClr val="tx1"/>
+        </a:fontRef>
+      </a:style>
+    </a:lnDef>
+    <a:txDef>
+      <a:spPr>
+        <a:noFill/>
+      </a:spPr>
+      <a:bodyPr wrap="none" rtlCol="0">
+        <a:spAutoFit/>
+      </a:bodyPr>
+      <a:lstStyle>
+        <a:defPPr algn="l">
+          <a:defRPr sz="1200">
+            <a:latin typeface="IBM Plex Sans" panose="020B0503050203000203" pitchFamily="34" charset="0"/>
+          </a:defRPr>
+        </a:defPPr>
+      </a:lstStyle>
+    </a:txDef>
+  </a:objectDefaults>
   <a:extraClrSchemeLst/>
   <a:extLst>
     <a:ext uri="{05A4C25C-085E-4340-85A3-A5531E510DB2}">

</xml_diff>

<commit_message>
#173 Create registration scenarios
</commit_message>
<xml_diff>
--- a/pages/img/Architecture docs images.pptx
+++ b/pages/img/Architecture docs images.pptx
@@ -7,7 +7,6 @@
   <p:sldIdLst>
     <p:sldId id="256" r:id="rId2"/>
     <p:sldId id="257" r:id="rId3"/>
-    <p:sldId id="258" r:id="rId4"/>
   </p:sldIdLst>
   <p:sldSz cx="12192000" cy="6858000"/>
   <p:notesSz cx="6858000" cy="9144000"/>
@@ -5700,86 +5699,6 @@
     <p:extLst>
       <p:ext uri="{BB962C8B-B14F-4D97-AF65-F5344CB8AC3E}">
         <p14:creationId xmlns:p14="http://schemas.microsoft.com/office/powerpoint/2010/main" val="2184972057"/>
-      </p:ext>
-    </p:extLst>
-  </p:cSld>
-  <p:clrMapOvr>
-    <a:masterClrMapping/>
-  </p:clrMapOvr>
-</p:sld>
-</file>
-
-<file path=ppt/slides/slide3.xml><?xml version="1.0" encoding="utf-8"?>
-<p:sld xmlns:a="http://schemas.openxmlformats.org/drawingml/2006/main" xmlns:r="http://schemas.openxmlformats.org/officeDocument/2006/relationships" xmlns:p="http://schemas.openxmlformats.org/presentationml/2006/main">
-  <p:cSld>
-    <p:spTree>
-      <p:nvGrpSpPr>
-        <p:cNvPr id="1" name=""/>
-        <p:cNvGrpSpPr/>
-        <p:nvPr/>
-      </p:nvGrpSpPr>
-      <p:grpSpPr>
-        <a:xfrm>
-          <a:off x="0" y="0"/>
-          <a:ext cx="0" cy="0"/>
-          <a:chOff x="0" y="0"/>
-          <a:chExt cx="0" cy="0"/>
-        </a:xfrm>
-      </p:grpSpPr>
-      <p:sp>
-        <p:nvSpPr>
-          <p:cNvPr id="2" name="Title 1">
-            <a:extLst>
-              <a:ext uri="{FF2B5EF4-FFF2-40B4-BE49-F238E27FC236}">
-                <a16:creationId xmlns:a16="http://schemas.microsoft.com/office/drawing/2014/main" id="{8628C714-C54C-5140-935B-F0682F9B6E46}"/>
-              </a:ext>
-            </a:extLst>
-          </p:cNvPr>
-          <p:cNvSpPr>
-            <a:spLocks noGrp="1"/>
-          </p:cNvSpPr>
-          <p:nvPr>
-            <p:ph type="title"/>
-          </p:nvPr>
-        </p:nvSpPr>
-        <p:spPr/>
-        <p:txBody>
-          <a:bodyPr/>
-          <a:lstStyle/>
-          <a:p>
-            <a:endParaRPr lang="en-US"/>
-          </a:p>
-        </p:txBody>
-      </p:sp>
-      <p:sp>
-        <p:nvSpPr>
-          <p:cNvPr id="3" name="Content Placeholder 2">
-            <a:extLst>
-              <a:ext uri="{FF2B5EF4-FFF2-40B4-BE49-F238E27FC236}">
-                <a16:creationId xmlns:a16="http://schemas.microsoft.com/office/drawing/2014/main" id="{8B0FDDF2-9879-574B-851E-8E2134340BF2}"/>
-              </a:ext>
-            </a:extLst>
-          </p:cNvPr>
-          <p:cNvSpPr>
-            <a:spLocks noGrp="1"/>
-          </p:cNvSpPr>
-          <p:nvPr>
-            <p:ph idx="1"/>
-          </p:nvPr>
-        </p:nvSpPr>
-        <p:spPr/>
-        <p:txBody>
-          <a:bodyPr/>
-          <a:lstStyle/>
-          <a:p>
-            <a:endParaRPr lang="en-US"/>
-          </a:p>
-        </p:txBody>
-      </p:sp>
-    </p:spTree>
-    <p:extLst>
-      <p:ext uri="{BB962C8B-B14F-4D97-AF65-F5344CB8AC3E}">
-        <p14:creationId xmlns:p14="http://schemas.microsoft.com/office/powerpoint/2010/main" val="2945251610"/>
       </p:ext>
     </p:extLst>
   </p:cSld>

</xml_diff>